<commit_message>
NF Simple deployment diagram NF gitignore for temp DbSchema an MS Office files
</commit_message>
<xml_diff>
--- a/rdm-docs/rdm.pptx
+++ b/rdm-docs/rdm.pptx
@@ -3688,12 +3688,15 @@
         </p:nvSpPr>
         <p:spPr>
           <a:xfrm>
-            <a:off x="3096768" y="4163568"/>
+            <a:off x="3188208" y="2042160"/>
             <a:ext cx="1908048" cy="1834896"/>
           </a:xfrm>
           <a:prstGeom prst="rect">
             <a:avLst/>
           </a:prstGeom>
+          <a:solidFill>
+            <a:srgbClr val="00B0F0"/>
+          </a:solidFill>
         </p:spPr>
         <p:style>
           <a:lnRef idx="2">
@@ -3741,7 +3744,7 @@
         </p:nvSpPr>
         <p:spPr>
           <a:xfrm>
-            <a:off x="5474208" y="4163568"/>
+            <a:off x="5565648" y="2042160"/>
             <a:ext cx="1969008" cy="1834896"/>
           </a:xfrm>
           <a:prstGeom prst="rect">
@@ -3773,6 +3776,13 @@
               <a:rPr lang="en-US" dirty="0"/>
               <a:t>rdm-rest.jar</a:t>
             </a:r>
+          </a:p>
+          <a:p>
+            <a:pPr algn="ctr"/>
+            <a:r>
+              <a:rPr lang="en-US" dirty="0"/>
+              <a:t>&lt;spring-boot&gt;</a:t>
+            </a:r>
             <a:endParaRPr lang="ru-RU" dirty="0"/>
           </a:p>
         </p:txBody>
@@ -3791,7 +3801,7 @@
         </p:nvSpPr>
         <p:spPr>
           <a:xfrm>
-            <a:off x="3442716" y="4764024"/>
+            <a:off x="3534156" y="2508504"/>
             <a:ext cx="1216152" cy="914400"/>
           </a:xfrm>
           <a:prstGeom prst="rect">
@@ -3823,16 +3833,24 @@
               <a:rPr lang="en-US" dirty="0" err="1"/>
               <a:t>rdm-ui.war</a:t>
             </a:r>
+            <a:endParaRPr lang="en-US" dirty="0"/>
+          </a:p>
+          <a:p>
+            <a:pPr algn="ctr"/>
+            <a:r>
+              <a:rPr lang="en-US" dirty="0"/>
+              <a:t>&lt;n2o&gt;</a:t>
+            </a:r>
             <a:endParaRPr lang="ru-RU" dirty="0"/>
           </a:p>
         </p:txBody>
       </p:sp>
       <p:sp>
         <p:nvSpPr>
-          <p:cNvPr id="8" name="Стрелка: вправо 7">
-            <a:extLst>
-              <a:ext uri="{FF2B5EF4-FFF2-40B4-BE49-F238E27FC236}">
-                <a16:creationId xmlns:a16="http://schemas.microsoft.com/office/drawing/2014/main" id="{370715B2-6AAE-4FC1-9D29-9D6032DDF78D}"/>
+          <p:cNvPr id="9" name="Прямоугольник 8">
+            <a:extLst>
+              <a:ext uri="{FF2B5EF4-FFF2-40B4-BE49-F238E27FC236}">
+                <a16:creationId xmlns:a16="http://schemas.microsoft.com/office/drawing/2014/main" id="{AA97FECD-5ADA-46FE-996C-B84341A426EC}"/>
               </a:ext>
             </a:extLst>
           </p:cNvPr>
@@ -3841,54 +3859,8 @@
         </p:nvSpPr>
         <p:spPr>
           <a:xfrm>
-            <a:off x="5004816" y="5102352"/>
-            <a:ext cx="469392" cy="45719"/>
-          </a:xfrm>
-          <a:prstGeom prst="rightArrow">
-            <a:avLst/>
-          </a:prstGeom>
-        </p:spPr>
-        <p:style>
-          <a:lnRef idx="2">
-            <a:schemeClr val="accent1">
-              <a:shade val="50000"/>
-            </a:schemeClr>
-          </a:lnRef>
-          <a:fillRef idx="1">
-            <a:schemeClr val="accent1"/>
-          </a:fillRef>
-          <a:effectRef idx="0">
-            <a:schemeClr val="accent1"/>
-          </a:effectRef>
-          <a:fontRef idx="minor">
-            <a:schemeClr val="lt1"/>
-          </a:fontRef>
-        </p:style>
-        <p:txBody>
-          <a:bodyPr rtlCol="0" anchor="ctr"/>
-          <a:lstStyle/>
-          <a:p>
-            <a:pPr algn="ctr"/>
-            <a:endParaRPr lang="ru-RU"/>
-          </a:p>
-        </p:txBody>
-      </p:sp>
-      <p:sp>
-        <p:nvSpPr>
-          <p:cNvPr id="9" name="Прямоугольник 8">
-            <a:extLst>
-              <a:ext uri="{FF2B5EF4-FFF2-40B4-BE49-F238E27FC236}">
-                <a16:creationId xmlns:a16="http://schemas.microsoft.com/office/drawing/2014/main" id="{AA97FECD-5ADA-46FE-996C-B84341A426EC}"/>
-              </a:ext>
-            </a:extLst>
-          </p:cNvPr>
-          <p:cNvSpPr/>
-          <p:nvPr/>
-        </p:nvSpPr>
-        <p:spPr>
-          <a:xfrm>
-            <a:off x="3096768" y="1914144"/>
-            <a:ext cx="4413504" cy="853440"/>
+            <a:off x="3188208" y="869942"/>
+            <a:ext cx="4346448" cy="853440"/>
           </a:xfrm>
           <a:prstGeom prst="rect">
             <a:avLst/>
@@ -3918,6 +3890,383 @@
             <a:r>
               <a:rPr lang="en-US" dirty="0" err="1"/>
               <a:t>nginx</a:t>
+            </a:r>
+            <a:endParaRPr lang="ru-RU" dirty="0"/>
+          </a:p>
+        </p:txBody>
+      </p:sp>
+      <p:sp>
+        <p:nvSpPr>
+          <p:cNvPr id="2" name="Цилиндр 1">
+            <a:extLst>
+              <a:ext uri="{FF2B5EF4-FFF2-40B4-BE49-F238E27FC236}">
+                <a16:creationId xmlns:a16="http://schemas.microsoft.com/office/drawing/2014/main" id="{374C0A75-CF9B-4F6A-94C8-3BA0CE32B056}"/>
+              </a:ext>
+            </a:extLst>
+          </p:cNvPr>
+          <p:cNvSpPr/>
+          <p:nvPr/>
+        </p:nvSpPr>
+        <p:spPr>
+          <a:xfrm>
+            <a:off x="5873496" y="4517136"/>
+            <a:ext cx="1353312" cy="1216152"/>
+          </a:xfrm>
+          <a:prstGeom prst="can">
+            <a:avLst/>
+          </a:prstGeom>
+        </p:spPr>
+        <p:style>
+          <a:lnRef idx="2">
+            <a:schemeClr val="accent1">
+              <a:shade val="50000"/>
+            </a:schemeClr>
+          </a:lnRef>
+          <a:fillRef idx="1">
+            <a:schemeClr val="accent1"/>
+          </a:fillRef>
+          <a:effectRef idx="0">
+            <a:schemeClr val="accent1"/>
+          </a:effectRef>
+          <a:fontRef idx="minor">
+            <a:schemeClr val="lt1"/>
+          </a:fontRef>
+        </p:style>
+        <p:txBody>
+          <a:bodyPr rtlCol="0" anchor="ctr"/>
+          <a:lstStyle/>
+          <a:p>
+            <a:pPr algn="ctr"/>
+            <a:r>
+              <a:rPr lang="en-US" dirty="0"/>
+              <a:t>PostgreSQL</a:t>
+            </a:r>
+          </a:p>
+        </p:txBody>
+      </p:sp>
+      <p:cxnSp>
+        <p:nvCxnSpPr>
+          <p:cNvPr id="7" name="Прямая со стрелкой 6">
+            <a:extLst>
+              <a:ext uri="{FF2B5EF4-FFF2-40B4-BE49-F238E27FC236}">
+                <a16:creationId xmlns:a16="http://schemas.microsoft.com/office/drawing/2014/main" id="{D8FC9BE9-D883-4F14-8F5E-5B6DC92400A5}"/>
+              </a:ext>
+            </a:extLst>
+          </p:cNvPr>
+          <p:cNvCxnSpPr>
+            <a:stCxn id="5" idx="2"/>
+            <a:endCxn id="2" idx="1"/>
+          </p:cNvCxnSpPr>
+          <p:nvPr/>
+        </p:nvCxnSpPr>
+        <p:spPr>
+          <a:xfrm>
+            <a:off x="6550152" y="3877056"/>
+            <a:ext cx="0" cy="640080"/>
+          </a:xfrm>
+          <a:prstGeom prst="straightConnector1">
+            <a:avLst/>
+          </a:prstGeom>
+          <a:ln>
+            <a:tailEnd type="triangle"/>
+          </a:ln>
+        </p:spPr>
+        <p:style>
+          <a:lnRef idx="1">
+            <a:schemeClr val="accent1"/>
+          </a:lnRef>
+          <a:fillRef idx="0">
+            <a:schemeClr val="accent1"/>
+          </a:fillRef>
+          <a:effectRef idx="0">
+            <a:schemeClr val="accent1"/>
+          </a:effectRef>
+          <a:fontRef idx="minor">
+            <a:schemeClr val="tx1"/>
+          </a:fontRef>
+        </p:style>
+      </p:cxnSp>
+      <p:cxnSp>
+        <p:nvCxnSpPr>
+          <p:cNvPr id="11" name="Прямая со стрелкой 10">
+            <a:extLst>
+              <a:ext uri="{FF2B5EF4-FFF2-40B4-BE49-F238E27FC236}">
+                <a16:creationId xmlns:a16="http://schemas.microsoft.com/office/drawing/2014/main" id="{E4D15A19-B1EB-4E00-8A08-BF6BF8EC6932}"/>
+              </a:ext>
+            </a:extLst>
+          </p:cNvPr>
+          <p:cNvCxnSpPr>
+            <a:stCxn id="6" idx="3"/>
+          </p:cNvCxnSpPr>
+          <p:nvPr/>
+        </p:nvCxnSpPr>
+        <p:spPr>
+          <a:xfrm>
+            <a:off x="4750308" y="2965704"/>
+            <a:ext cx="815340" cy="0"/>
+          </a:xfrm>
+          <a:prstGeom prst="straightConnector1">
+            <a:avLst/>
+          </a:prstGeom>
+          <a:ln>
+            <a:tailEnd type="triangle"/>
+          </a:ln>
+        </p:spPr>
+        <p:style>
+          <a:lnRef idx="1">
+            <a:schemeClr val="accent1"/>
+          </a:lnRef>
+          <a:fillRef idx="0">
+            <a:schemeClr val="accent1"/>
+          </a:fillRef>
+          <a:effectRef idx="0">
+            <a:schemeClr val="accent1"/>
+          </a:effectRef>
+          <a:fontRef idx="minor">
+            <a:schemeClr val="tx1"/>
+          </a:fontRef>
+        </p:style>
+      </p:cxnSp>
+      <p:sp>
+        <p:nvSpPr>
+          <p:cNvPr id="13" name="TextBox 12">
+            <a:extLst>
+              <a:ext uri="{FF2B5EF4-FFF2-40B4-BE49-F238E27FC236}">
+                <a16:creationId xmlns:a16="http://schemas.microsoft.com/office/drawing/2014/main" id="{B93931F3-DC91-4046-AF4B-9A0BA881BB74}"/>
+              </a:ext>
+            </a:extLst>
+          </p:cNvPr>
+          <p:cNvSpPr txBox="1"/>
+          <p:nvPr/>
+        </p:nvSpPr>
+        <p:spPr>
+          <a:xfrm>
+            <a:off x="5041981" y="2670048"/>
+            <a:ext cx="576825" cy="369332"/>
+          </a:xfrm>
+          <a:prstGeom prst="rect">
+            <a:avLst/>
+          </a:prstGeom>
+          <a:noFill/>
+        </p:spPr>
+        <p:txBody>
+          <a:bodyPr wrap="none" rtlCol="0">
+            <a:spAutoFit/>
+          </a:bodyPr>
+          <a:lstStyle/>
+          <a:p>
+            <a:r>
+              <a:rPr lang="en-US" dirty="0"/>
+              <a:t>http</a:t>
+            </a:r>
+            <a:endParaRPr lang="ru-RU" dirty="0"/>
+          </a:p>
+        </p:txBody>
+      </p:sp>
+      <p:cxnSp>
+        <p:nvCxnSpPr>
+          <p:cNvPr id="16" name="Прямая со стрелкой 15">
+            <a:extLst>
+              <a:ext uri="{FF2B5EF4-FFF2-40B4-BE49-F238E27FC236}">
+                <a16:creationId xmlns:a16="http://schemas.microsoft.com/office/drawing/2014/main" id="{0149D3C8-8733-4241-B0FC-FF81F26B8CA4}"/>
+              </a:ext>
+            </a:extLst>
+          </p:cNvPr>
+          <p:cNvCxnSpPr>
+            <a:cxnSpLocks/>
+            <a:endCxn id="4" idx="0"/>
+          </p:cNvCxnSpPr>
+          <p:nvPr/>
+        </p:nvCxnSpPr>
+        <p:spPr>
+          <a:xfrm>
+            <a:off x="4142232" y="1723382"/>
+            <a:ext cx="0" cy="318778"/>
+          </a:xfrm>
+          <a:prstGeom prst="straightConnector1">
+            <a:avLst/>
+          </a:prstGeom>
+          <a:ln>
+            <a:tailEnd type="triangle"/>
+          </a:ln>
+        </p:spPr>
+        <p:style>
+          <a:lnRef idx="1">
+            <a:schemeClr val="accent1"/>
+          </a:lnRef>
+          <a:fillRef idx="0">
+            <a:schemeClr val="accent1"/>
+          </a:fillRef>
+          <a:effectRef idx="0">
+            <a:schemeClr val="accent1"/>
+          </a:effectRef>
+          <a:fontRef idx="minor">
+            <a:schemeClr val="tx1"/>
+          </a:fontRef>
+        </p:style>
+      </p:cxnSp>
+      <p:cxnSp>
+        <p:nvCxnSpPr>
+          <p:cNvPr id="19" name="Прямая со стрелкой 18">
+            <a:extLst>
+              <a:ext uri="{FF2B5EF4-FFF2-40B4-BE49-F238E27FC236}">
+                <a16:creationId xmlns:a16="http://schemas.microsoft.com/office/drawing/2014/main" id="{10D7FE3D-F16A-4836-B1E0-8CB2B98A66A0}"/>
+              </a:ext>
+            </a:extLst>
+          </p:cNvPr>
+          <p:cNvCxnSpPr>
+            <a:cxnSpLocks/>
+            <a:endCxn id="5" idx="0"/>
+          </p:cNvCxnSpPr>
+          <p:nvPr/>
+        </p:nvCxnSpPr>
+        <p:spPr>
+          <a:xfrm>
+            <a:off x="6550152" y="1723382"/>
+            <a:ext cx="0" cy="318778"/>
+          </a:xfrm>
+          <a:prstGeom prst="straightConnector1">
+            <a:avLst/>
+          </a:prstGeom>
+          <a:ln>
+            <a:tailEnd type="triangle"/>
+          </a:ln>
+        </p:spPr>
+        <p:style>
+          <a:lnRef idx="1">
+            <a:schemeClr val="accent1"/>
+          </a:lnRef>
+          <a:fillRef idx="0">
+            <a:schemeClr val="accent1"/>
+          </a:fillRef>
+          <a:effectRef idx="0">
+            <a:schemeClr val="accent1"/>
+          </a:effectRef>
+          <a:fontRef idx="minor">
+            <a:schemeClr val="tx1"/>
+          </a:fontRef>
+        </p:style>
+      </p:cxnSp>
+      <p:sp>
+        <p:nvSpPr>
+          <p:cNvPr id="22" name="TextBox 21">
+            <a:extLst>
+              <a:ext uri="{FF2B5EF4-FFF2-40B4-BE49-F238E27FC236}">
+                <a16:creationId xmlns:a16="http://schemas.microsoft.com/office/drawing/2014/main" id="{4FE24358-3E9C-4086-875C-3F3D9BF9E8FD}"/>
+              </a:ext>
+            </a:extLst>
+          </p:cNvPr>
+          <p:cNvSpPr txBox="1"/>
+          <p:nvPr/>
+        </p:nvSpPr>
+        <p:spPr>
+          <a:xfrm>
+            <a:off x="4142232" y="1698105"/>
+            <a:ext cx="576825" cy="369332"/>
+          </a:xfrm>
+          <a:prstGeom prst="rect">
+            <a:avLst/>
+          </a:prstGeom>
+          <a:noFill/>
+        </p:spPr>
+        <p:txBody>
+          <a:bodyPr wrap="none" rtlCol="0">
+            <a:spAutoFit/>
+          </a:bodyPr>
+          <a:lstStyle/>
+          <a:p>
+            <a:r>
+              <a:rPr lang="en-US" dirty="0"/>
+              <a:t>http</a:t>
+            </a:r>
+            <a:endParaRPr lang="ru-RU" dirty="0"/>
+          </a:p>
+        </p:txBody>
+      </p:sp>
+      <p:sp>
+        <p:nvSpPr>
+          <p:cNvPr id="23" name="TextBox 22">
+            <a:extLst>
+              <a:ext uri="{FF2B5EF4-FFF2-40B4-BE49-F238E27FC236}">
+                <a16:creationId xmlns:a16="http://schemas.microsoft.com/office/drawing/2014/main" id="{C1DDCE29-EF99-46C0-BFB4-5F9B5685F98F}"/>
+              </a:ext>
+            </a:extLst>
+          </p:cNvPr>
+          <p:cNvSpPr txBox="1"/>
+          <p:nvPr/>
+        </p:nvSpPr>
+        <p:spPr>
+          <a:xfrm>
+            <a:off x="6550152" y="1694795"/>
+            <a:ext cx="576825" cy="369332"/>
+          </a:xfrm>
+          <a:prstGeom prst="rect">
+            <a:avLst/>
+          </a:prstGeom>
+          <a:noFill/>
+        </p:spPr>
+        <p:txBody>
+          <a:bodyPr wrap="none" rtlCol="0">
+            <a:spAutoFit/>
+          </a:bodyPr>
+          <a:lstStyle/>
+          <a:p>
+            <a:r>
+              <a:rPr lang="en-US" dirty="0"/>
+              <a:t>http</a:t>
+            </a:r>
+            <a:endParaRPr lang="ru-RU" dirty="0"/>
+          </a:p>
+        </p:txBody>
+      </p:sp>
+      <p:sp>
+        <p:nvSpPr>
+          <p:cNvPr id="24" name="Прямоугольник 23">
+            <a:extLst>
+              <a:ext uri="{FF2B5EF4-FFF2-40B4-BE49-F238E27FC236}">
+                <a16:creationId xmlns:a16="http://schemas.microsoft.com/office/drawing/2014/main" id="{C30E665C-EBFC-48EE-B90A-A0D53DF8C6A7}"/>
+              </a:ext>
+            </a:extLst>
+          </p:cNvPr>
+          <p:cNvSpPr/>
+          <p:nvPr/>
+        </p:nvSpPr>
+        <p:spPr>
+          <a:xfrm>
+            <a:off x="6196585" y="3558278"/>
+            <a:ext cx="707133" cy="318778"/>
+          </a:xfrm>
+          <a:prstGeom prst="rect">
+            <a:avLst/>
+          </a:prstGeom>
+          <a:solidFill>
+            <a:srgbClr val="00B0F0"/>
+          </a:solidFill>
+        </p:spPr>
+        <p:style>
+          <a:lnRef idx="2">
+            <a:schemeClr val="accent1">
+              <a:shade val="50000"/>
+            </a:schemeClr>
+          </a:lnRef>
+          <a:fillRef idx="1">
+            <a:schemeClr val="accent1"/>
+          </a:fillRef>
+          <a:effectRef idx="0">
+            <a:schemeClr val="accent1"/>
+          </a:effectRef>
+          <a:fontRef idx="minor">
+            <a:schemeClr val="lt1"/>
+          </a:fontRef>
+        </p:style>
+        <p:txBody>
+          <a:bodyPr rtlCol="0" anchor="ctr"/>
+          <a:lstStyle/>
+          <a:p>
+            <a:pPr algn="ctr"/>
+            <a:r>
+              <a:rPr lang="en-US" dirty="0" err="1"/>
+              <a:t>jdbc</a:t>
             </a:r>
             <a:endParaRPr lang="ru-RU" dirty="0"/>
           </a:p>

</xml_diff>